<commit_message>
added some features: 1. built-ins: Copy(x,y), Find(x), convert(s, i) 2. added forms.js library, completed event binding
</commit_message>
<xml_diff>
--- a/TaskWizard.pptx
+++ b/TaskWizard.pptx
@@ -300,7 +300,7 @@
             <a:fld id="{1D8BD707-D9CF-40AE-B4C6-C98DA3205C09}" type="datetimeFigureOut">
               <a:rPr lang="en-US" smtClean="0"/>
               <a:pPr/>
-              <a:t>01/04/2015</a:t>
+              <a:t>4/11/2015</a:t>
             </a:fld>
             <a:endParaRPr lang="en-US"/>
           </a:p>
@@ -467,7 +467,7 @@
             <a:fld id="{1D8BD707-D9CF-40AE-B4C6-C98DA3205C09}" type="datetimeFigureOut">
               <a:rPr lang="en-US" smtClean="0"/>
               <a:pPr/>
-              <a:t>01/04/2015</a:t>
+              <a:t>4/11/2015</a:t>
             </a:fld>
             <a:endParaRPr lang="en-US"/>
           </a:p>
@@ -644,7 +644,7 @@
             <a:fld id="{1D8BD707-D9CF-40AE-B4C6-C98DA3205C09}" type="datetimeFigureOut">
               <a:rPr lang="en-US" smtClean="0"/>
               <a:pPr/>
-              <a:t>01/04/2015</a:t>
+              <a:t>4/11/2015</a:t>
             </a:fld>
             <a:endParaRPr lang="en-US"/>
           </a:p>
@@ -811,7 +811,7 @@
             <a:fld id="{1D8BD707-D9CF-40AE-B4C6-C98DA3205C09}" type="datetimeFigureOut">
               <a:rPr lang="en-US" smtClean="0"/>
               <a:pPr/>
-              <a:t>01/04/2015</a:t>
+              <a:t>4/11/2015</a:t>
             </a:fld>
             <a:endParaRPr lang="en-US"/>
           </a:p>
@@ -1054,7 +1054,7 @@
             <a:fld id="{1D8BD707-D9CF-40AE-B4C6-C98DA3205C09}" type="datetimeFigureOut">
               <a:rPr lang="en-US" smtClean="0"/>
               <a:pPr/>
-              <a:t>01/04/2015</a:t>
+              <a:t>4/11/2015</a:t>
             </a:fld>
             <a:endParaRPr lang="en-US"/>
           </a:p>
@@ -1339,7 +1339,7 @@
             <a:fld id="{1D8BD707-D9CF-40AE-B4C6-C98DA3205C09}" type="datetimeFigureOut">
               <a:rPr lang="en-US" smtClean="0"/>
               <a:pPr/>
-              <a:t>01/04/2015</a:t>
+              <a:t>4/11/2015</a:t>
             </a:fld>
             <a:endParaRPr lang="en-US"/>
           </a:p>
@@ -1758,7 +1758,7 @@
             <a:fld id="{1D8BD707-D9CF-40AE-B4C6-C98DA3205C09}" type="datetimeFigureOut">
               <a:rPr lang="en-US" smtClean="0"/>
               <a:pPr/>
-              <a:t>01/04/2015</a:t>
+              <a:t>4/11/2015</a:t>
             </a:fld>
             <a:endParaRPr lang="en-US"/>
           </a:p>
@@ -1873,7 +1873,7 @@
             <a:fld id="{1D8BD707-D9CF-40AE-B4C6-C98DA3205C09}" type="datetimeFigureOut">
               <a:rPr lang="en-US" smtClean="0"/>
               <a:pPr/>
-              <a:t>01/04/2015</a:t>
+              <a:t>4/11/2015</a:t>
             </a:fld>
             <a:endParaRPr lang="en-US"/>
           </a:p>
@@ -1965,7 +1965,7 @@
             <a:fld id="{1D8BD707-D9CF-40AE-B4C6-C98DA3205C09}" type="datetimeFigureOut">
               <a:rPr lang="en-US" smtClean="0"/>
               <a:pPr/>
-              <a:t>01/04/2015</a:t>
+              <a:t>4/11/2015</a:t>
             </a:fld>
             <a:endParaRPr lang="en-US"/>
           </a:p>
@@ -2239,7 +2239,7 @@
             <a:fld id="{1D8BD707-D9CF-40AE-B4C6-C98DA3205C09}" type="datetimeFigureOut">
               <a:rPr lang="en-US" smtClean="0"/>
               <a:pPr/>
-              <a:t>01/04/2015</a:t>
+              <a:t>4/11/2015</a:t>
             </a:fld>
             <a:endParaRPr lang="en-US"/>
           </a:p>
@@ -2489,7 +2489,7 @@
             <a:fld id="{1D8BD707-D9CF-40AE-B4C6-C98DA3205C09}" type="datetimeFigureOut">
               <a:rPr lang="en-US" smtClean="0"/>
               <a:pPr/>
-              <a:t>01/04/2015</a:t>
+              <a:t>4/11/2015</a:t>
             </a:fld>
             <a:endParaRPr lang="en-US"/>
           </a:p>
@@ -2699,7 +2699,7 @@
             <a:fld id="{1D8BD707-D9CF-40AE-B4C6-C98DA3205C09}" type="datetimeFigureOut">
               <a:rPr lang="en-US" smtClean="0"/>
               <a:pPr/>
-              <a:t>01/04/2015</a:t>
+              <a:t>4/11/2015</a:t>
             </a:fld>
             <a:endParaRPr lang="en-US"/>
           </a:p>
@@ -4239,15 +4239,110 @@
                   <a:srgbClr val="FF0000"/>
                 </a:solidFill>
               </a:rPr>
-              <a:t>Script-Lab Common </a:t>
-            </a:r>
+              <a:t>Script-Lab Common APIs – </a:t>
+            </a:r>
+            <a:r>
+              <a:rPr lang="en-US" dirty="0" err="1" smtClean="0">
+                <a:solidFill>
+                  <a:srgbClr val="FF0000"/>
+                </a:solidFill>
+              </a:rPr>
+              <a:t>BuiltIns</a:t>
+            </a:r>
+            <a:endParaRPr lang="en-US" dirty="0">
+              <a:solidFill>
+                <a:srgbClr val="FF0000"/>
+              </a:solidFill>
+            </a:endParaRPr>
+          </a:p>
+        </p:txBody>
+      </p:sp>
+      <p:sp>
+        <p:nvSpPr>
+          <p:cNvPr id="5" name="TextBox 4"/>
+          <p:cNvSpPr txBox="1"/>
+          <p:nvPr/>
+        </p:nvSpPr>
+        <p:spPr>
+          <a:xfrm>
+            <a:off x="1066800" y="1143000"/>
+            <a:ext cx="5338897" cy="3139321"/>
+          </a:xfrm>
+          <a:prstGeom prst="rect">
+            <a:avLst/>
+          </a:prstGeom>
+          <a:noFill/>
+        </p:spPr>
+        <p:txBody>
+          <a:bodyPr wrap="none" rtlCol="0">
+            <a:spAutoFit/>
+          </a:bodyPr>
+          <a:lstStyle/>
+          <a:p>
+            <a:r>
+              <a:rPr lang="en-US" dirty="0" smtClean="0"/>
+              <a:t>Load(x) – load an external </a:t>
+            </a:r>
+            <a:r>
+              <a:rPr lang="en-US" dirty="0" err="1" smtClean="0"/>
+              <a:t>js</a:t>
+            </a:r>
+            <a:r>
+              <a:rPr lang="en-US" dirty="0" smtClean="0"/>
+              <a:t> library</a:t>
+            </a:r>
+          </a:p>
+          <a:p>
+            <a:r>
+              <a:rPr lang="en-US" dirty="0" smtClean="0"/>
+              <a:t>out (x) – print string to console or SL or JVM</a:t>
+            </a:r>
+          </a:p>
+          <a:p>
+            <a:r>
+              <a:rPr lang="en-US" dirty="0" err="1" smtClean="0"/>
+              <a:t>Outln</a:t>
+            </a:r>
+            <a:r>
+              <a:rPr lang="en-US" dirty="0" smtClean="0"/>
+              <a:t>(x) – print a line of string to SL or JVM</a:t>
+            </a:r>
+          </a:p>
+          <a:p>
+            <a:r>
+              <a:rPr lang="en-US" dirty="0" smtClean="0"/>
+              <a:t>Clear() – clear SL console</a:t>
+            </a:r>
+          </a:p>
+          <a:p>
+            <a:r>
+              <a:rPr lang="en-US" dirty="0" smtClean="0"/>
+              <a:t>String input() – show question box to get string </a:t>
+            </a:r>
+            <a:r>
+              <a:rPr lang="en-US" dirty="0" smtClean="0"/>
+              <a:t>data</a:t>
+            </a:r>
+            <a:endParaRPr lang="en-US" dirty="0" smtClean="0"/>
+          </a:p>
+          <a:p>
+            <a:r>
+              <a:rPr lang="en-US" dirty="0" smtClean="0"/>
+              <a:t>Exit() – exit </a:t>
+            </a:r>
+            <a:r>
+              <a:rPr lang="en-US" dirty="0" smtClean="0"/>
+              <a:t>SL</a:t>
+            </a:r>
+          </a:p>
+          <a:p>
             <a:r>
               <a:rPr lang="en-US" dirty="0" smtClean="0">
                 <a:solidFill>
                   <a:srgbClr val="FF0000"/>
                 </a:solidFill>
               </a:rPr>
-              <a:t>APIs – </a:t>
+              <a:t>Copy(</a:t>
             </a:r>
             <a:r>
               <a:rPr lang="en-US" dirty="0" err="1" smtClean="0">
@@ -4255,7 +4350,61 @@
                   <a:srgbClr val="FF0000"/>
                 </a:solidFill>
               </a:rPr>
-              <a:t>Built</a:t>
+              <a:t>x,y</a:t>
+            </a:r>
+            <a:r>
+              <a:rPr lang="en-US" dirty="0" smtClean="0">
+                <a:solidFill>
+                  <a:srgbClr val="FF0000"/>
+                </a:solidFill>
+              </a:rPr>
+              <a:t>) – create new variable named x from string ‘x’</a:t>
+            </a:r>
+          </a:p>
+          <a:p>
+            <a:r>
+              <a:rPr lang="en-US" dirty="0" smtClean="0">
+                <a:solidFill>
+                  <a:srgbClr val="FF0000"/>
+                </a:solidFill>
+              </a:rPr>
+              <a:t>	</a:t>
+            </a:r>
+            <a:r>
+              <a:rPr lang="en-US" dirty="0" smtClean="0">
+                <a:solidFill>
+                  <a:srgbClr val="FF0000"/>
+                </a:solidFill>
+              </a:rPr>
+              <a:t>valued by object named ‘y’</a:t>
+            </a:r>
+          </a:p>
+          <a:p>
+            <a:r>
+              <a:rPr lang="en-US" dirty="0" smtClean="0">
+                <a:solidFill>
+                  <a:srgbClr val="FF0000"/>
+                </a:solidFill>
+              </a:rPr>
+              <a:t>Find(x) – return variable named ‘x’</a:t>
+            </a:r>
+          </a:p>
+          <a:p>
+            <a:r>
+              <a:rPr lang="en-US" dirty="0" smtClean="0">
+                <a:solidFill>
+                  <a:srgbClr val="FF0000"/>
+                </a:solidFill>
+              </a:rPr>
+              <a:t>convert</a:t>
+            </a:r>
+            <a:r>
+              <a:rPr lang="en-US" dirty="0" smtClean="0">
+                <a:solidFill>
+                  <a:srgbClr val="FF0000"/>
+                </a:solidFill>
+              </a:rPr>
+              <a:t>(s, </a:t>
             </a:r>
             <a:r>
               <a:rPr lang="en-US" dirty="0" err="1" smtClean="0">
@@ -4263,84 +4412,37 @@
                   <a:srgbClr val="FF0000"/>
                 </a:solidFill>
               </a:rPr>
-              <a:t>Ins</a:t>
-            </a:r>
-            <a:endParaRPr lang="en-US" dirty="0">
+              <a:t>i</a:t>
+            </a:r>
+            <a:r>
+              <a:rPr lang="en-US" dirty="0" smtClean="0">
+                <a:solidFill>
+                  <a:srgbClr val="FF0000"/>
+                </a:solidFill>
+              </a:rPr>
+              <a:t>) – connect </a:t>
+            </a:r>
+            <a:r>
+              <a:rPr lang="en-US" dirty="0" err="1" smtClean="0">
+                <a:solidFill>
+                  <a:srgbClr val="FF0000"/>
+                </a:solidFill>
+              </a:rPr>
+              <a:t>js</a:t>
+            </a:r>
+            <a:r>
+              <a:rPr lang="en-US" dirty="0" smtClean="0">
+                <a:solidFill>
+                  <a:srgbClr val="FF0000"/>
+                </a:solidFill>
+              </a:rPr>
+              <a:t> object ‘s’ to java interface ‘I’</a:t>
+            </a:r>
+            <a:endParaRPr lang="en-US" dirty="0" smtClean="0">
               <a:solidFill>
                 <a:srgbClr val="FF0000"/>
               </a:solidFill>
             </a:endParaRPr>
-          </a:p>
-        </p:txBody>
-      </p:sp>
-      <p:sp>
-        <p:nvSpPr>
-          <p:cNvPr id="5" name="TextBox 4"/>
-          <p:cNvSpPr txBox="1"/>
-          <p:nvPr/>
-        </p:nvSpPr>
-        <p:spPr>
-          <a:xfrm>
-            <a:off x="1066800" y="1143000"/>
-            <a:ext cx="5052986" cy="2031325"/>
-          </a:xfrm>
-          <a:prstGeom prst="rect">
-            <a:avLst/>
-          </a:prstGeom>
-          <a:noFill/>
-        </p:spPr>
-        <p:txBody>
-          <a:bodyPr wrap="none" rtlCol="0">
-            <a:spAutoFit/>
-          </a:bodyPr>
-          <a:lstStyle/>
-          <a:p>
-            <a:r>
-              <a:rPr lang="en-US" dirty="0" smtClean="0"/>
-              <a:t>Load(x) – load an external </a:t>
-            </a:r>
-            <a:r>
-              <a:rPr lang="en-US" dirty="0" err="1" smtClean="0"/>
-              <a:t>js</a:t>
-            </a:r>
-            <a:r>
-              <a:rPr lang="en-US" dirty="0" smtClean="0"/>
-              <a:t> library</a:t>
-            </a:r>
-          </a:p>
-          <a:p>
-            <a:r>
-              <a:rPr lang="en-US" dirty="0" smtClean="0"/>
-              <a:t>out (x) – print string to console or SL or JVM</a:t>
-            </a:r>
-          </a:p>
-          <a:p>
-            <a:r>
-              <a:rPr lang="en-US" dirty="0" err="1" smtClean="0"/>
-              <a:t>Outln</a:t>
-            </a:r>
-            <a:r>
-              <a:rPr lang="en-US" dirty="0" smtClean="0"/>
-              <a:t>(x) – print a line of string to SL or JVM</a:t>
-            </a:r>
-          </a:p>
-          <a:p>
-            <a:r>
-              <a:rPr lang="en-US" dirty="0" smtClean="0"/>
-              <a:t>Clear() – clear SL console</a:t>
-            </a:r>
-          </a:p>
-          <a:p>
-            <a:r>
-              <a:rPr lang="en-US" dirty="0" smtClean="0"/>
-              <a:t>String input() – show question box to get string data</a:t>
-            </a:r>
-          </a:p>
-          <a:p>
-            <a:r>
-              <a:rPr lang="en-US" dirty="0" smtClean="0"/>
-              <a:t>Exit() – exit SL</a:t>
-            </a:r>
           </a:p>
           <a:p>
             <a:endParaRPr lang="en-US" dirty="0" smtClean="0"/>
@@ -4476,15 +4578,7 @@
             </a:r>
             <a:r>
               <a:rPr lang="en-US" dirty="0" smtClean="0"/>
-              <a:t> </a:t>
-            </a:r>
-            <a:r>
-              <a:rPr lang="en-US" dirty="0" smtClean="0"/>
-              <a:t>eng</a:t>
-            </a:r>
-            <a:r>
-              <a:rPr lang="en-US" dirty="0" smtClean="0"/>
-              <a:t>) - </a:t>
+              <a:t> eng) - </a:t>
             </a:r>
           </a:p>
           <a:p>
@@ -6667,13 +6761,8 @@
           <a:p>
             <a:r>
               <a:rPr lang="en-US" dirty="0" smtClean="0"/>
-              <a:t>.jar </a:t>
-            </a:r>
-            <a:r>
-              <a:rPr lang="en-US" dirty="0" smtClean="0"/>
-              <a:t>library</a:t>
-            </a:r>
-            <a:endParaRPr lang="en-US" dirty="0" smtClean="0"/>
+              <a:t>.jar library</a:t>
+            </a:r>
           </a:p>
           <a:p>
             <a:r>
@@ -8129,15 +8218,7 @@
                   <a:srgbClr val="00B050"/>
                 </a:solidFill>
               </a:rPr>
-              <a:t>Object </a:t>
-            </a:r>
-            <a:r>
-              <a:rPr lang="en-US" dirty="0" smtClean="0">
-                <a:solidFill>
-                  <a:srgbClr val="00B050"/>
-                </a:solidFill>
-              </a:rPr>
-              <a:t>Engine</a:t>
+              <a:t>Object Engine</a:t>
             </a:r>
             <a:endParaRPr lang="en-US" dirty="0">
               <a:solidFill>
@@ -9301,15 +9382,7 @@
                   <a:srgbClr val="00B050"/>
                 </a:solidFill>
               </a:rPr>
-              <a:t>Object </a:t>
-            </a:r>
-            <a:r>
-              <a:rPr lang="en-US" dirty="0" smtClean="0">
-                <a:solidFill>
-                  <a:srgbClr val="00B050"/>
-                </a:solidFill>
-              </a:rPr>
-              <a:t>Engine</a:t>
+              <a:t>Object Engine</a:t>
             </a:r>
             <a:endParaRPr lang="en-US" dirty="0">
               <a:solidFill>

</xml_diff>